<commit_message>
aulas 02 03 04 e 05
</commit_message>
<xml_diff>
--- a/Aula 00 - Aula Magna e Orientações/Aula 00 - Aula Magna e Orientações v3.pptx
+++ b/Aula 00 - Aula Magna e Orientações/Aula 00 - Aula Magna e Orientações v3.pptx
@@ -6,7 +6,7 @@
     <p:sldMasterId id="2147483699" r:id="rId2"/>
   </p:sldMasterIdLst>
   <p:notesMasterIdLst>
-    <p:notesMasterId r:id="rId19"/>
+    <p:notesMasterId r:id="rId20"/>
   </p:notesMasterIdLst>
   <p:sldIdLst>
     <p:sldId id="398" r:id="rId3"/>
@@ -23,8 +23,9 @@
     <p:sldId id="828" r:id="rId14"/>
     <p:sldId id="830" r:id="rId15"/>
     <p:sldId id="405" r:id="rId16"/>
-    <p:sldId id="403" r:id="rId17"/>
-    <p:sldId id="812" r:id="rId18"/>
+    <p:sldId id="831" r:id="rId17"/>
+    <p:sldId id="403" r:id="rId18"/>
+    <p:sldId id="812" r:id="rId19"/>
   </p:sldIdLst>
   <p:sldSz cx="9144000" cy="6858000" type="screen4x3"/>
   <p:notesSz cx="6858000" cy="9144000"/>
@@ -225,7 +226,7 @@
             <a:fld id="{4EA5E1ED-E65E-440E-8A4B-5F5DC973F797}" type="datetimeFigureOut">
               <a:rPr lang="pt-BR" smtClean="0"/>
               <a:pPr/>
-              <a:t>01/08/2023</a:t>
+              <a:t>12/09/2023</a:t>
             </a:fld>
             <a:endParaRPr lang="pt-BR"/>
           </a:p>
@@ -642,7 +643,7 @@
           <a:p>
             <a:fld id="{1787AD07-0C2A-424C-83EF-FCCF4A0D3BA0}" type="datetime1">
               <a:rPr lang="pt-BR" smtClean="0"/>
-              <a:t>01/08/2023</a:t>
+              <a:t>12/09/2023</a:t>
             </a:fld>
             <a:endParaRPr lang="pt-BR"/>
           </a:p>
@@ -811,7 +812,7 @@
           <a:p>
             <a:fld id="{2F92FB66-59C8-46A5-AD82-5DAAFD2DC390}" type="datetime1">
               <a:rPr lang="pt-BR" smtClean="0"/>
-              <a:t>01/08/2023</a:t>
+              <a:t>12/09/2023</a:t>
             </a:fld>
             <a:endParaRPr lang="pt-BR"/>
           </a:p>
@@ -990,7 +991,7 @@
           <a:p>
             <a:fld id="{3D5CC8D2-C61E-4471-AD68-1C0D45A8EAFC}" type="datetime1">
               <a:rPr lang="pt-BR" smtClean="0"/>
-              <a:t>01/08/2023</a:t>
+              <a:t>12/09/2023</a:t>
             </a:fld>
             <a:endParaRPr lang="pt-BR"/>
           </a:p>
@@ -1133,7 +1134,7 @@
           <a:p>
             <a:fld id="{C3E38981-C08A-4A29-B885-392FB4EE0709}" type="datetime1">
               <a:rPr lang="pt-BR" smtClean="0"/>
-              <a:t>01/08/2023</a:t>
+              <a:t>12/09/2023</a:t>
             </a:fld>
             <a:endParaRPr lang="en-US" dirty="0"/>
           </a:p>
@@ -1518,7 +1519,7 @@
           <a:p>
             <a:fld id="{2CFE63D7-5B4A-40A4-8FD4-EA63D1010EB7}" type="datetime1">
               <a:rPr lang="pt-BR" smtClean="0"/>
-              <a:t>01/08/2023</a:t>
+              <a:t>12/09/2023</a:t>
             </a:fld>
             <a:endParaRPr lang="en-US" dirty="0"/>
           </a:p>
@@ -1740,7 +1741,7 @@
           <a:p>
             <a:fld id="{A9719147-5557-4D76-A2C3-BF25882771D2}" type="datetime1">
               <a:rPr lang="pt-BR" smtClean="0"/>
-              <a:t>01/08/2023</a:t>
+              <a:t>12/09/2023</a:t>
             </a:fld>
             <a:endParaRPr lang="en-US" dirty="0"/>
           </a:p>
@@ -2053,7 +2054,7 @@
           <a:p>
             <a:fld id="{66250340-7104-44A8-88A9-88532CCE9C1C}" type="datetime1">
               <a:rPr lang="pt-BR" smtClean="0"/>
-              <a:t>01/08/2023</a:t>
+              <a:t>12/09/2023</a:t>
             </a:fld>
             <a:endParaRPr lang="en-US" dirty="0"/>
           </a:p>
@@ -2238,7 +2239,7 @@
           <a:p>
             <a:fld id="{D047EA32-7810-48BE-A9BB-EA3D8AA5AD34}" type="datetime1">
               <a:rPr lang="pt-BR" smtClean="0"/>
-              <a:t>01/08/2023</a:t>
+              <a:t>12/09/2023</a:t>
             </a:fld>
             <a:endParaRPr lang="en-US" dirty="0"/>
           </a:p>
@@ -2386,7 +2387,7 @@
           <a:p>
             <a:fld id="{7C28E9E9-B91F-400E-BE43-87BB4B5C6F4E}" type="datetime1">
               <a:rPr lang="pt-BR" smtClean="0"/>
-              <a:t>01/08/2023</a:t>
+              <a:t>12/09/2023</a:t>
             </a:fld>
             <a:endParaRPr lang="en-US" dirty="0"/>
           </a:p>
@@ -2638,7 +2639,7 @@
           <a:p>
             <a:fld id="{A9E773EA-BFD5-41D4-8CCD-2C9F67DAB481}" type="datetime1">
               <a:rPr lang="pt-BR" smtClean="0"/>
-              <a:t>01/08/2023</a:t>
+              <a:t>12/09/2023</a:t>
             </a:fld>
             <a:endParaRPr lang="pt-BR" dirty="0"/>
           </a:p>
@@ -2840,7 +2841,7 @@
           <a:p>
             <a:fld id="{DAA7C8B6-CF57-4A95-AF6C-A77E6C230ED3}" type="datetime1">
               <a:rPr lang="pt-BR" smtClean="0"/>
-              <a:t>01/08/2023</a:t>
+              <a:t>12/09/2023</a:t>
             </a:fld>
             <a:endParaRPr lang="pt-BR"/>
           </a:p>
@@ -3124,7 +3125,7 @@
           <a:p>
             <a:fld id="{34D50989-24C8-4023-9B0D-A6D249548FD9}" type="datetime1">
               <a:rPr lang="pt-BR" smtClean="0"/>
-              <a:t>01/08/2023</a:t>
+              <a:t>12/09/2023</a:t>
             </a:fld>
             <a:endParaRPr lang="pt-BR"/>
           </a:p>
@@ -3360,7 +3361,7 @@
           <a:p>
             <a:fld id="{8D9BC96A-9776-4585-A439-BC9E2DA226C1}" type="datetime1">
               <a:rPr lang="pt-BR" smtClean="0"/>
-              <a:t>01/08/2023</a:t>
+              <a:t>12/09/2023</a:t>
             </a:fld>
             <a:endParaRPr lang="pt-BR"/>
           </a:p>
@@ -3743,7 +3744,7 @@
           <a:p>
             <a:fld id="{7D12BE36-2922-4567-BD67-201EFA21BF6D}" type="datetime1">
               <a:rPr lang="pt-BR" smtClean="0"/>
-              <a:t>01/08/2023</a:t>
+              <a:t>12/09/2023</a:t>
             </a:fld>
             <a:endParaRPr lang="pt-BR"/>
           </a:p>
@@ -3855,7 +3856,7 @@
           <a:p>
             <a:fld id="{E5B462A9-4B1E-4013-BFB1-FC92225AC2F2}" type="datetime1">
               <a:rPr lang="pt-BR" smtClean="0"/>
-              <a:t>01/08/2023</a:t>
+              <a:t>12/09/2023</a:t>
             </a:fld>
             <a:endParaRPr lang="pt-BR"/>
           </a:p>
@@ -3939,7 +3940,7 @@
           <a:p>
             <a:fld id="{D0E6EC7A-67E7-4978-9BAE-C8F82A40B13B}" type="datetime1">
               <a:rPr lang="pt-BR" smtClean="0"/>
-              <a:t>01/08/2023</a:t>
+              <a:t>12/09/2023</a:t>
             </a:fld>
             <a:endParaRPr lang="pt-BR"/>
           </a:p>
@@ -4221,7 +4222,7 @@
           <a:p>
             <a:fld id="{6E085A4E-80B8-47DD-9D9B-8E1B205CBB30}" type="datetime1">
               <a:rPr lang="pt-BR" smtClean="0"/>
-              <a:t>01/08/2023</a:t>
+              <a:t>12/09/2023</a:t>
             </a:fld>
             <a:endParaRPr lang="pt-BR"/>
           </a:p>
@@ -4480,7 +4481,7 @@
           <a:p>
             <a:fld id="{F4E9A02C-D9AD-4B8C-9B93-B0980E8E86EB}" type="datetime1">
               <a:rPr lang="pt-BR" smtClean="0"/>
-              <a:t>01/08/2023</a:t>
+              <a:t>12/09/2023</a:t>
             </a:fld>
             <a:endParaRPr lang="pt-BR"/>
           </a:p>
@@ -4692,7 +4693,7 @@
           <a:p>
             <a:fld id="{202762D0-3A59-4B14-83BA-8E0FC8A60AB1}" type="datetime1">
               <a:rPr lang="pt-BR" smtClean="0"/>
-              <a:t>01/08/2023</a:t>
+              <a:t>12/09/2023</a:t>
             </a:fld>
             <a:endParaRPr lang="pt-BR"/>
           </a:p>
@@ -6050,13 +6051,13 @@
   <p:clrMapOvr>
     <a:masterClrMapping/>
   </p:clrMapOvr>
-  <mc:AlternateContent xmlns:mc="http://schemas.openxmlformats.org/markup-compatibility/2006">
-    <mc:Choice xmlns:p14="http://schemas.microsoft.com/office/powerpoint/2010/main" Requires="p14">
+  <mc:AlternateContent xmlns:mc="http://schemas.openxmlformats.org/markup-compatibility/2006" xmlns:p14="http://schemas.microsoft.com/office/powerpoint/2010/main">
+    <mc:Choice Requires="p14">
       <p:transition spd="med" p14:dur="700">
         <p:fade/>
       </p:transition>
     </mc:Choice>
-    <mc:Fallback>
+    <mc:Fallback xmlns="">
       <p:transition spd="med">
         <p:fade/>
       </p:transition>
@@ -7284,13 +7285,13 @@
   <p:clrMapOvr>
     <a:masterClrMapping/>
   </p:clrMapOvr>
-  <mc:AlternateContent xmlns:mc="http://schemas.openxmlformats.org/markup-compatibility/2006">
-    <mc:Choice xmlns:p14="http://schemas.microsoft.com/office/powerpoint/2010/main" Requires="p14">
+  <mc:AlternateContent xmlns:mc="http://schemas.openxmlformats.org/markup-compatibility/2006" xmlns:p14="http://schemas.microsoft.com/office/powerpoint/2010/main">
+    <mc:Choice Requires="p14">
       <p:transition spd="med" p14:dur="700">
         <p:fade/>
       </p:transition>
     </mc:Choice>
-    <mc:Fallback>
+    <mc:Fallback xmlns="">
       <p:transition spd="med">
         <p:fade/>
       </p:transition>
@@ -8406,13 +8407,13 @@
   <p:clrMapOvr>
     <a:masterClrMapping/>
   </p:clrMapOvr>
-  <mc:AlternateContent xmlns:mc="http://schemas.openxmlformats.org/markup-compatibility/2006">
-    <mc:Choice xmlns:p14="http://schemas.microsoft.com/office/powerpoint/2010/main" Requires="p14">
+  <mc:AlternateContent xmlns:mc="http://schemas.openxmlformats.org/markup-compatibility/2006" xmlns:p14="http://schemas.microsoft.com/office/powerpoint/2010/main">
+    <mc:Choice Requires="p14">
       <p:transition spd="med" p14:dur="700">
         <p:fade/>
       </p:transition>
     </mc:Choice>
-    <mc:Fallback>
+    <mc:Fallback xmlns="">
       <p:transition spd="med">
         <p:fade/>
       </p:transition>
@@ -8759,13 +8760,13 @@
   <p:clrMapOvr>
     <a:masterClrMapping/>
   </p:clrMapOvr>
-  <mc:AlternateContent xmlns:mc="http://schemas.openxmlformats.org/markup-compatibility/2006">
-    <mc:Choice xmlns:p14="http://schemas.microsoft.com/office/powerpoint/2010/main" Requires="p14">
+  <mc:AlternateContent xmlns:mc="http://schemas.openxmlformats.org/markup-compatibility/2006" xmlns:p14="http://schemas.microsoft.com/office/powerpoint/2010/main">
+    <mc:Choice Requires="p14">
       <p:transition spd="med" p14:dur="700">
         <p:fade/>
       </p:transition>
     </mc:Choice>
-    <mc:Fallback>
+    <mc:Fallback xmlns="">
       <p:transition spd="med">
         <p:fade/>
       </p:transition>
@@ -8847,7 +8848,7 @@
           <p:nvPr>
             <p:extLst>
               <p:ext uri="{D42A27DB-BD31-4B8C-83A1-F6EECF244321}">
-                <p14:modId xmlns:p14="http://schemas.microsoft.com/office/powerpoint/2010/main" val="805159290"/>
+                <p14:modId xmlns:p14="http://schemas.microsoft.com/office/powerpoint/2010/main" val="352331362"/>
               </p:ext>
             </p:extLst>
           </p:nvPr>
@@ -9041,9 +9042,12 @@
                     <a:bodyPr/>
                     <a:lstStyle/>
                     <a:p>
-                      <a:endParaRPr lang="pt-BR" sz="900" dirty="0">
-                        <a:latin typeface="Gotham HTF"/>
-                      </a:endParaRPr>
+                      <a:r>
+                        <a:rPr lang="pt-BR" sz="900" dirty="0">
+                          <a:latin typeface="Gotham HTF"/>
+                        </a:rPr>
+                        <a:t>OK</a:t>
+                      </a:r>
                     </a:p>
                   </a:txBody>
                   <a:tcPr/>
@@ -9108,12 +9112,15 @@
                     <a:bodyPr/>
                     <a:lstStyle/>
                     <a:p>
-                      <a:endParaRPr lang="pt-BR" sz="900" dirty="0">
-                        <a:solidFill>
-                          <a:srgbClr val="FF0000"/>
-                        </a:solidFill>
-                        <a:latin typeface="Gotham HTF"/>
-                      </a:endParaRPr>
+                      <a:r>
+                        <a:rPr lang="pt-BR" sz="900" dirty="0">
+                          <a:solidFill>
+                            <a:srgbClr val="FF0000"/>
+                          </a:solidFill>
+                          <a:latin typeface="Gotham HTF"/>
+                        </a:rPr>
+                        <a:t>OK</a:t>
+                      </a:r>
                     </a:p>
                   </a:txBody>
                   <a:tcPr/>
@@ -9195,12 +9202,15 @@
                         <a:tabLst/>
                         <a:defRPr/>
                       </a:pPr>
-                      <a:endParaRPr lang="pt-BR" sz="900" dirty="0">
-                        <a:solidFill>
-                          <a:srgbClr val="FF0000"/>
-                        </a:solidFill>
-                        <a:latin typeface="Gotham HTF"/>
-                      </a:endParaRPr>
+                      <a:r>
+                        <a:rPr lang="pt-BR" sz="900" dirty="0">
+                          <a:solidFill>
+                            <a:srgbClr val="FF0000"/>
+                          </a:solidFill>
+                          <a:latin typeface="Gotham HTF"/>
+                        </a:rPr>
+                        <a:t>OK</a:t>
+                      </a:r>
                     </a:p>
                   </a:txBody>
                   <a:tcPr/>
@@ -9282,12 +9292,15 @@
                         <a:tabLst/>
                         <a:defRPr/>
                       </a:pPr>
-                      <a:endParaRPr lang="pt-BR" sz="900" dirty="0">
-                        <a:solidFill>
-                          <a:srgbClr val="FF0000"/>
-                        </a:solidFill>
-                        <a:latin typeface="Gotham HTF"/>
-                      </a:endParaRPr>
+                      <a:r>
+                        <a:rPr lang="pt-BR" sz="900" dirty="0">
+                          <a:solidFill>
+                            <a:srgbClr val="FF0000"/>
+                          </a:solidFill>
+                          <a:latin typeface="Gotham HTF"/>
+                        </a:rPr>
+                        <a:t>Depois</a:t>
+                      </a:r>
                     </a:p>
                   </a:txBody>
                   <a:tcPr/>
@@ -9369,9 +9382,12 @@
                     <a:bodyPr/>
                     <a:lstStyle/>
                     <a:p>
-                      <a:endParaRPr lang="pt-BR" sz="900" dirty="0">
-                        <a:latin typeface="Gotham HTF"/>
-                      </a:endParaRPr>
+                      <a:r>
+                        <a:rPr lang="pt-BR" sz="900" dirty="0">
+                          <a:latin typeface="Gotham HTF"/>
+                        </a:rPr>
+                        <a:t>Depois</a:t>
+                      </a:r>
                     </a:p>
                   </a:txBody>
                   <a:tcPr/>
@@ -9470,12 +9486,15 @@
                         <a:tabLst/>
                         <a:defRPr/>
                       </a:pPr>
-                      <a:endParaRPr lang="pt-BR" sz="900" dirty="0">
-                        <a:solidFill>
-                          <a:srgbClr val="FF0000"/>
-                        </a:solidFill>
-                        <a:latin typeface="Gotham HTF"/>
-                      </a:endParaRPr>
+                      <a:r>
+                        <a:rPr lang="pt-BR" sz="900" dirty="0">
+                          <a:solidFill>
+                            <a:srgbClr val="FF0000"/>
+                          </a:solidFill>
+                          <a:latin typeface="Gotham HTF"/>
+                        </a:rPr>
+                        <a:t>Depois</a:t>
+                      </a:r>
                     </a:p>
                   </a:txBody>
                   <a:tcPr/>
@@ -10454,13 +10473,13 @@
   <p:clrMapOvr>
     <a:masterClrMapping/>
   </p:clrMapOvr>
-  <mc:AlternateContent xmlns:mc="http://schemas.openxmlformats.org/markup-compatibility/2006">
-    <mc:Choice xmlns:p14="http://schemas.microsoft.com/office/powerpoint/2010/main" Requires="p14">
+  <mc:AlternateContent xmlns:mc="http://schemas.openxmlformats.org/markup-compatibility/2006" xmlns:p14="http://schemas.microsoft.com/office/powerpoint/2010/main">
+    <mc:Choice Requires="p14">
       <p:transition spd="med" p14:dur="700">
         <p:fade/>
       </p:transition>
     </mc:Choice>
-    <mc:Fallback>
+    <mc:Fallback xmlns="">
       <p:transition spd="med">
         <p:fade/>
       </p:transition>
@@ -10470,6 +10489,1950 @@
 </file>
 
 <file path=ppt/slides/slide15.xml><?xml version="1.0" encoding="utf-8"?>
+<p:sld xmlns:a="http://schemas.openxmlformats.org/drawingml/2006/main" xmlns:r="http://schemas.openxmlformats.org/officeDocument/2006/relationships" xmlns:p="http://schemas.openxmlformats.org/presentationml/2006/main">
+  <p:cSld>
+    <p:spTree>
+      <p:nvGrpSpPr>
+        <p:cNvPr id="1" name=""/>
+        <p:cNvGrpSpPr/>
+        <p:nvPr/>
+      </p:nvGrpSpPr>
+      <p:grpSpPr>
+        <a:xfrm>
+          <a:off x="0" y="0"/>
+          <a:ext cx="0" cy="0"/>
+          <a:chOff x="0" y="0"/>
+          <a:chExt cx="0" cy="0"/>
+        </a:xfrm>
+      </p:grpSpPr>
+      <p:sp>
+        <p:nvSpPr>
+          <p:cNvPr id="9" name="TextBox 6">
+            <a:extLst>
+              <a:ext uri="{FF2B5EF4-FFF2-40B4-BE49-F238E27FC236}">
+                <a16:creationId xmlns:a16="http://schemas.microsoft.com/office/drawing/2014/main" id="{225765AD-71F7-DC36-6CE8-E9873BEE1F3F}"/>
+              </a:ext>
+            </a:extLst>
+          </p:cNvPr>
+          <p:cNvSpPr txBox="1"/>
+          <p:nvPr/>
+        </p:nvSpPr>
+        <p:spPr>
+          <a:xfrm>
+            <a:off x="228600" y="133350"/>
+            <a:ext cx="6324600" cy="707886"/>
+          </a:xfrm>
+          <a:prstGeom prst="rect">
+            <a:avLst/>
+          </a:prstGeom>
+          <a:noFill/>
+        </p:spPr>
+        <p:txBody>
+          <a:bodyPr wrap="square" rtlCol="0">
+            <a:spAutoFit/>
+          </a:bodyPr>
+          <a:lstStyle/>
+          <a:p>
+            <a:r>
+              <a:rPr lang="pt-BR" sz="4000" dirty="0">
+                <a:solidFill>
+                  <a:srgbClr val="ED145B"/>
+                </a:solidFill>
+                <a:latin typeface="Gotham HTF" pitchFamily="50" charset="0"/>
+                <a:cs typeface="Gotham HTF Light"/>
+              </a:rPr>
+              <a:t>Calendário do Semestre</a:t>
+            </a:r>
+          </a:p>
+        </p:txBody>
+      </p:sp>
+      <p:graphicFrame>
+        <p:nvGraphicFramePr>
+          <p:cNvPr id="2" name="Tabela 2">
+            <a:extLst>
+              <a:ext uri="{FF2B5EF4-FFF2-40B4-BE49-F238E27FC236}">
+                <a16:creationId xmlns:a16="http://schemas.microsoft.com/office/drawing/2014/main" id="{2775B54B-01E7-8B55-8F81-04C8E761F9F1}"/>
+              </a:ext>
+            </a:extLst>
+          </p:cNvPr>
+          <p:cNvGraphicFramePr>
+            <a:graphicFrameLocks noGrp="1"/>
+          </p:cNvGraphicFramePr>
+          <p:nvPr>
+            <p:extLst>
+              <p:ext uri="{D42A27DB-BD31-4B8C-83A1-F6EECF244321}">
+                <p14:modId xmlns:p14="http://schemas.microsoft.com/office/powerpoint/2010/main" val="2862984272"/>
+              </p:ext>
+            </p:extLst>
+          </p:nvPr>
+        </p:nvGraphicFramePr>
+        <p:xfrm>
+          <a:off x="395536" y="764704"/>
+          <a:ext cx="7920880" cy="6001265"/>
+        </p:xfrm>
+        <a:graphic>
+          <a:graphicData uri="http://schemas.openxmlformats.org/drawingml/2006/table">
+            <a:tbl>
+              <a:tblPr firstRow="1" bandRow="1">
+                <a:tableStyleId>{8EC20E35-A176-4012-BC5E-935CFFF8708E}</a:tableStyleId>
+              </a:tblPr>
+              <a:tblGrid>
+                <a:gridCol w="446179">
+                  <a:extLst>
+                    <a:ext uri="{9D8B030D-6E8A-4147-A177-3AD203B41FA5}">
+                      <a16:colId xmlns:a16="http://schemas.microsoft.com/office/drawing/2014/main" val="2693078763"/>
+                    </a:ext>
+                  </a:extLst>
+                </a:gridCol>
+                <a:gridCol w="1661045">
+                  <a:extLst>
+                    <a:ext uri="{9D8B030D-6E8A-4147-A177-3AD203B41FA5}">
+                      <a16:colId xmlns:a16="http://schemas.microsoft.com/office/drawing/2014/main" val="4220425498"/>
+                    </a:ext>
+                  </a:extLst>
+                </a:gridCol>
+                <a:gridCol w="4001607">
+                  <a:extLst>
+                    <a:ext uri="{9D8B030D-6E8A-4147-A177-3AD203B41FA5}">
+                      <a16:colId xmlns:a16="http://schemas.microsoft.com/office/drawing/2014/main" val="1150807886"/>
+                    </a:ext>
+                  </a:extLst>
+                </a:gridCol>
+                <a:gridCol w="1812049">
+                  <a:extLst>
+                    <a:ext uri="{9D8B030D-6E8A-4147-A177-3AD203B41FA5}">
+                      <a16:colId xmlns:a16="http://schemas.microsoft.com/office/drawing/2014/main" val="2945034481"/>
+                    </a:ext>
+                  </a:extLst>
+                </a:gridCol>
+              </a:tblGrid>
+              <a:tr h="333595">
+                <a:tc>
+                  <a:txBody>
+                    <a:bodyPr/>
+                    <a:lstStyle/>
+                    <a:p>
+                      <a:pPr algn="ctr"/>
+                      <a:r>
+                        <a:rPr lang="pt-BR" sz="1050" dirty="0">
+                          <a:latin typeface="Gotham HTF"/>
+                        </a:rPr>
+                        <a:t>Aula</a:t>
+                      </a:r>
+                    </a:p>
+                  </a:txBody>
+                  <a:tcPr anchor="ctr">
+                    <a:solidFill>
+                      <a:srgbClr val="ED265B"/>
+                    </a:solidFill>
+                  </a:tcPr>
+                </a:tc>
+                <a:tc>
+                  <a:txBody>
+                    <a:bodyPr/>
+                    <a:lstStyle/>
+                    <a:p>
+                      <a:pPr algn="ctr"/>
+                      <a:r>
+                        <a:rPr lang="pt-BR" sz="1050" dirty="0">
+                          <a:latin typeface="Gotham HTF"/>
+                        </a:rPr>
+                        <a:t>Data</a:t>
+                      </a:r>
+                    </a:p>
+                  </a:txBody>
+                  <a:tcPr anchor="ctr">
+                    <a:solidFill>
+                      <a:srgbClr val="ED265B"/>
+                    </a:solidFill>
+                  </a:tcPr>
+                </a:tc>
+                <a:tc>
+                  <a:txBody>
+                    <a:bodyPr/>
+                    <a:lstStyle/>
+                    <a:p>
+                      <a:pPr algn="ctr"/>
+                      <a:r>
+                        <a:rPr lang="pt-BR" sz="1050" dirty="0">
+                          <a:latin typeface="Gotham HTF"/>
+                        </a:rPr>
+                        <a:t>Conteúdo</a:t>
+                      </a:r>
+                    </a:p>
+                  </a:txBody>
+                  <a:tcPr anchor="ctr">
+                    <a:solidFill>
+                      <a:srgbClr val="ED265B"/>
+                    </a:solidFill>
+                  </a:tcPr>
+                </a:tc>
+                <a:tc>
+                  <a:txBody>
+                    <a:bodyPr/>
+                    <a:lstStyle/>
+                    <a:p>
+                      <a:pPr algn="ctr"/>
+                      <a:r>
+                        <a:rPr lang="pt-BR" sz="1050" dirty="0">
+                          <a:latin typeface="Gotham HTF"/>
+                        </a:rPr>
+                        <a:t>Observações</a:t>
+                      </a:r>
+                    </a:p>
+                  </a:txBody>
+                  <a:tcPr anchor="ctr">
+                    <a:solidFill>
+                      <a:srgbClr val="ED265B"/>
+                    </a:solidFill>
+                  </a:tcPr>
+                </a:tc>
+                <a:extLst>
+                  <a:ext uri="{0D108BD9-81ED-4DB2-BD59-A6C34878D82A}">
+                    <a16:rowId xmlns:a16="http://schemas.microsoft.com/office/drawing/2014/main" val="2910658431"/>
+                  </a:ext>
+                </a:extLst>
+              </a:tr>
+              <a:tr h="333595">
+                <a:tc>
+                  <a:txBody>
+                    <a:bodyPr/>
+                    <a:lstStyle/>
+                    <a:p>
+                      <a:r>
+                        <a:rPr lang="pt-BR" sz="900" dirty="0">
+                          <a:solidFill>
+                            <a:schemeClr val="tx1"/>
+                          </a:solidFill>
+                          <a:latin typeface="Gotham HTF"/>
+                        </a:rPr>
+                        <a:t>01</a:t>
+                      </a:r>
+                    </a:p>
+                  </a:txBody>
+                  <a:tcPr/>
+                </a:tc>
+                <a:tc>
+                  <a:txBody>
+                    <a:bodyPr/>
+                    <a:lstStyle/>
+                    <a:p>
+                      <a:r>
+                        <a:rPr lang="pt-BR" sz="900" dirty="0">
+                          <a:latin typeface="Gotham HTF"/>
+                        </a:rPr>
+                        <a:t>Semana 1 – 02/08</a:t>
+                      </a:r>
+                    </a:p>
+                  </a:txBody>
+                  <a:tcPr/>
+                </a:tc>
+                <a:tc>
+                  <a:txBody>
+                    <a:bodyPr/>
+                    <a:lstStyle/>
+                    <a:p>
+                      <a:r>
+                        <a:rPr lang="pt-BR" sz="900" dirty="0">
+                          <a:latin typeface="Gotham HTF"/>
+                        </a:rPr>
+                        <a:t>Aula 00 – Aula Magna e Orientações</a:t>
+                      </a:r>
+                    </a:p>
+                    <a:p>
+                      <a:r>
+                        <a:rPr lang="pt-BR" sz="900" dirty="0">
+                          <a:latin typeface="Gotham HTF"/>
+                        </a:rPr>
+                        <a:t>Aula 01 – Diagramas de Caso de Uso</a:t>
+                      </a:r>
+                    </a:p>
+                  </a:txBody>
+                  <a:tcPr/>
+                </a:tc>
+                <a:tc>
+                  <a:txBody>
+                    <a:bodyPr/>
+                    <a:lstStyle/>
+                    <a:p>
+                      <a:r>
+                        <a:rPr lang="pt-BR" sz="900" dirty="0">
+                          <a:latin typeface="Gotham HTF"/>
+                        </a:rPr>
+                        <a:t>OK</a:t>
+                      </a:r>
+                    </a:p>
+                  </a:txBody>
+                  <a:tcPr/>
+                </a:tc>
+                <a:extLst>
+                  <a:ext uri="{0D108BD9-81ED-4DB2-BD59-A6C34878D82A}">
+                    <a16:rowId xmlns:a16="http://schemas.microsoft.com/office/drawing/2014/main" val="3879989962"/>
+                  </a:ext>
+                </a:extLst>
+              </a:tr>
+              <a:tr h="333595">
+                <a:tc>
+                  <a:txBody>
+                    <a:bodyPr/>
+                    <a:lstStyle/>
+                    <a:p>
+                      <a:r>
+                        <a:rPr lang="pt-BR" sz="900" dirty="0">
+                          <a:solidFill>
+                            <a:schemeClr val="tx1"/>
+                          </a:solidFill>
+                          <a:latin typeface="Gotham HTF"/>
+                        </a:rPr>
+                        <a:t>02</a:t>
+                      </a:r>
+                    </a:p>
+                  </a:txBody>
+                  <a:tcPr/>
+                </a:tc>
+                <a:tc>
+                  <a:txBody>
+                    <a:bodyPr/>
+                    <a:lstStyle/>
+                    <a:p>
+                      <a:r>
+                        <a:rPr lang="pt-BR" sz="900" dirty="0">
+                          <a:latin typeface="Gotham HTF"/>
+                        </a:rPr>
+                        <a:t>Semana 2 – 08/08 e 09/08</a:t>
+                      </a:r>
+                    </a:p>
+                  </a:txBody>
+                  <a:tcPr/>
+                </a:tc>
+                <a:tc>
+                  <a:txBody>
+                    <a:bodyPr/>
+                    <a:lstStyle/>
+                    <a:p>
+                      <a:r>
+                        <a:rPr lang="pt-BR" sz="900" dirty="0">
+                          <a:latin typeface="Gotham HTF"/>
+                        </a:rPr>
+                        <a:t>Aula 02 - Diagramas de Sequencia</a:t>
+                      </a:r>
+                    </a:p>
+                  </a:txBody>
+                  <a:tcPr/>
+                </a:tc>
+                <a:tc>
+                  <a:txBody>
+                    <a:bodyPr/>
+                    <a:lstStyle/>
+                    <a:p>
+                      <a:r>
+                        <a:rPr lang="pt-BR" sz="900" dirty="0">
+                          <a:solidFill>
+                            <a:srgbClr val="FF0000"/>
+                          </a:solidFill>
+                          <a:latin typeface="Gotham HTF"/>
+                        </a:rPr>
+                        <a:t>OK</a:t>
+                      </a:r>
+                    </a:p>
+                  </a:txBody>
+                  <a:tcPr/>
+                </a:tc>
+                <a:extLst>
+                  <a:ext uri="{0D108BD9-81ED-4DB2-BD59-A6C34878D82A}">
+                    <a16:rowId xmlns:a16="http://schemas.microsoft.com/office/drawing/2014/main" val="2549427757"/>
+                  </a:ext>
+                </a:extLst>
+              </a:tr>
+              <a:tr h="333595">
+                <a:tc>
+                  <a:txBody>
+                    <a:bodyPr/>
+                    <a:lstStyle/>
+                    <a:p>
+                      <a:r>
+                        <a:rPr lang="pt-BR" sz="900" dirty="0">
+                          <a:solidFill>
+                            <a:schemeClr val="tx1"/>
+                          </a:solidFill>
+                          <a:latin typeface="Gotham HTF"/>
+                        </a:rPr>
+                        <a:t>03</a:t>
+                      </a:r>
+                    </a:p>
+                  </a:txBody>
+                  <a:tcPr/>
+                </a:tc>
+                <a:tc>
+                  <a:txBody>
+                    <a:bodyPr/>
+                    <a:lstStyle/>
+                    <a:p>
+                      <a:r>
+                        <a:rPr lang="pt-BR" sz="900" dirty="0">
+                          <a:latin typeface="Gotham HTF"/>
+                        </a:rPr>
+                        <a:t>Semana 3 – 15/08 e 16/08</a:t>
+                      </a:r>
+                    </a:p>
+                  </a:txBody>
+                  <a:tcPr/>
+                </a:tc>
+                <a:tc>
+                  <a:txBody>
+                    <a:bodyPr/>
+                    <a:lstStyle/>
+                    <a:p>
+                      <a:r>
+                        <a:rPr lang="pt-BR" sz="900" dirty="0">
+                          <a:latin typeface="Gotham HTF"/>
+                        </a:rPr>
+                        <a:t>Aula 03 - Diagramas de Atividades</a:t>
+                      </a:r>
+                    </a:p>
+                  </a:txBody>
+                  <a:tcPr/>
+                </a:tc>
+                <a:tc>
+                  <a:txBody>
+                    <a:bodyPr/>
+                    <a:lstStyle/>
+                    <a:p>
+                      <a:pPr marL="0" marR="0" lvl="0" indent="0" algn="l" defTabSz="914400" rtl="0" eaLnBrk="1" fontAlgn="auto" latinLnBrk="0" hangingPunct="1">
+                        <a:lnSpc>
+                          <a:spcPct val="100000"/>
+                        </a:lnSpc>
+                        <a:spcBef>
+                          <a:spcPts val="0"/>
+                        </a:spcBef>
+                        <a:spcAft>
+                          <a:spcPts val="0"/>
+                        </a:spcAft>
+                        <a:buClrTx/>
+                        <a:buSzTx/>
+                        <a:buFontTx/>
+                        <a:buNone/>
+                        <a:tabLst/>
+                        <a:defRPr/>
+                      </a:pPr>
+                      <a:r>
+                        <a:rPr lang="pt-BR" sz="900" dirty="0">
+                          <a:solidFill>
+                            <a:srgbClr val="FF0000"/>
+                          </a:solidFill>
+                          <a:latin typeface="Gotham HTF"/>
+                        </a:rPr>
+                        <a:t>OK</a:t>
+                      </a:r>
+                    </a:p>
+                  </a:txBody>
+                  <a:tcPr/>
+                </a:tc>
+                <a:extLst>
+                  <a:ext uri="{0D108BD9-81ED-4DB2-BD59-A6C34878D82A}">
+                    <a16:rowId xmlns:a16="http://schemas.microsoft.com/office/drawing/2014/main" val="1124539082"/>
+                  </a:ext>
+                </a:extLst>
+              </a:tr>
+              <a:tr h="333595">
+                <a:tc>
+                  <a:txBody>
+                    <a:bodyPr/>
+                    <a:lstStyle/>
+                    <a:p>
+                      <a:r>
+                        <a:rPr lang="pt-BR" sz="900" dirty="0">
+                          <a:solidFill>
+                            <a:schemeClr val="tx1"/>
+                          </a:solidFill>
+                          <a:latin typeface="Gotham HTF"/>
+                        </a:rPr>
+                        <a:t>04</a:t>
+                      </a:r>
+                    </a:p>
+                  </a:txBody>
+                  <a:tcPr/>
+                </a:tc>
+                <a:tc>
+                  <a:txBody>
+                    <a:bodyPr/>
+                    <a:lstStyle/>
+                    <a:p>
+                      <a:r>
+                        <a:rPr lang="pt-BR" sz="900" dirty="0">
+                          <a:latin typeface="Gotham HTF"/>
+                        </a:rPr>
+                        <a:t>Semana 4 – 22/08 e 23/08</a:t>
+                      </a:r>
+                    </a:p>
+                  </a:txBody>
+                  <a:tcPr/>
+                </a:tc>
+                <a:tc>
+                  <a:txBody>
+                    <a:bodyPr/>
+                    <a:lstStyle/>
+                    <a:p>
+                      <a:r>
+                        <a:rPr lang="pt-BR" sz="900" strike="sngStrike" baseline="0" dirty="0">
+                          <a:latin typeface="Gotham HTF"/>
+                        </a:rPr>
+                        <a:t>Aula 04 - Diagramas de Comunicação</a:t>
+                      </a:r>
+                    </a:p>
+                    <a:p>
+                      <a:r>
+                        <a:rPr lang="pt-BR" sz="900" strike="noStrike" baseline="0" dirty="0">
+                          <a:latin typeface="Gotham HTF"/>
+                        </a:rPr>
+                        <a:t>Revisão Challenge – Sprint 3</a:t>
+                      </a:r>
+                    </a:p>
+                  </a:txBody>
+                  <a:tcPr/>
+                </a:tc>
+                <a:tc>
+                  <a:txBody>
+                    <a:bodyPr/>
+                    <a:lstStyle/>
+                    <a:p>
+                      <a:pPr marL="0" marR="0" lvl="0" indent="0" algn="l" defTabSz="914400" rtl="0" eaLnBrk="1" fontAlgn="auto" latinLnBrk="0" hangingPunct="1">
+                        <a:lnSpc>
+                          <a:spcPct val="100000"/>
+                        </a:lnSpc>
+                        <a:spcBef>
+                          <a:spcPts val="0"/>
+                        </a:spcBef>
+                        <a:spcAft>
+                          <a:spcPts val="0"/>
+                        </a:spcAft>
+                        <a:buClrTx/>
+                        <a:buSzTx/>
+                        <a:buFontTx/>
+                        <a:buNone/>
+                        <a:tabLst/>
+                        <a:defRPr/>
+                      </a:pPr>
+                      <a:r>
+                        <a:rPr lang="pt-BR" sz="900" dirty="0">
+                          <a:solidFill>
+                            <a:srgbClr val="FF0000"/>
+                          </a:solidFill>
+                          <a:latin typeface="Gotham HTF"/>
+                        </a:rPr>
+                        <a:t>OK</a:t>
+                      </a:r>
+                    </a:p>
+                  </a:txBody>
+                  <a:tcPr/>
+                </a:tc>
+                <a:extLst>
+                  <a:ext uri="{0D108BD9-81ED-4DB2-BD59-A6C34878D82A}">
+                    <a16:rowId xmlns:a16="http://schemas.microsoft.com/office/drawing/2014/main" val="2575748631"/>
+                  </a:ext>
+                </a:extLst>
+              </a:tr>
+              <a:tr h="333595">
+                <a:tc>
+                  <a:txBody>
+                    <a:bodyPr/>
+                    <a:lstStyle/>
+                    <a:p>
+                      <a:r>
+                        <a:rPr lang="pt-BR" sz="900" dirty="0">
+                          <a:solidFill>
+                            <a:schemeClr val="tx1"/>
+                          </a:solidFill>
+                          <a:latin typeface="Gotham HTF"/>
+                        </a:rPr>
+                        <a:t>05</a:t>
+                      </a:r>
+                    </a:p>
+                  </a:txBody>
+                  <a:tcPr/>
+                </a:tc>
+                <a:tc>
+                  <a:txBody>
+                    <a:bodyPr/>
+                    <a:lstStyle/>
+                    <a:p>
+                      <a:r>
+                        <a:rPr lang="pt-BR" sz="900" dirty="0">
+                          <a:latin typeface="Gotham HTF"/>
+                        </a:rPr>
+                        <a:t>Semana 5 – 29/08 e 30/08 </a:t>
+                      </a:r>
+                    </a:p>
+                  </a:txBody>
+                  <a:tcPr/>
+                </a:tc>
+                <a:tc>
+                  <a:txBody>
+                    <a:bodyPr/>
+                    <a:lstStyle/>
+                    <a:p>
+                      <a:pPr marL="0" marR="0" lvl="0" indent="0" algn="l" defTabSz="914400" rtl="0" eaLnBrk="1" fontAlgn="auto" latinLnBrk="0" hangingPunct="1">
+                        <a:lnSpc>
+                          <a:spcPct val="100000"/>
+                        </a:lnSpc>
+                        <a:spcBef>
+                          <a:spcPts val="0"/>
+                        </a:spcBef>
+                        <a:spcAft>
+                          <a:spcPts val="0"/>
+                        </a:spcAft>
+                        <a:buClrTx/>
+                        <a:buSzTx/>
+                        <a:buFontTx/>
+                        <a:buNone/>
+                        <a:tabLst/>
+                        <a:defRPr/>
+                      </a:pPr>
+                      <a:r>
+                        <a:rPr lang="pt-BR" sz="900" strike="sngStrike" baseline="0" dirty="0">
+                          <a:latin typeface="Gotham HTF"/>
+                        </a:rPr>
+                        <a:t>Aula 05 - Diagramas de Componentes</a:t>
+                      </a:r>
+                    </a:p>
+                    <a:p>
+                      <a:pPr marL="0" marR="0" lvl="0" indent="0" algn="l" defTabSz="914400" rtl="0" eaLnBrk="1" fontAlgn="auto" latinLnBrk="0" hangingPunct="1">
+                        <a:lnSpc>
+                          <a:spcPct val="100000"/>
+                        </a:lnSpc>
+                        <a:spcBef>
+                          <a:spcPts val="0"/>
+                        </a:spcBef>
+                        <a:spcAft>
+                          <a:spcPts val="0"/>
+                        </a:spcAft>
+                        <a:buClrTx/>
+                        <a:buSzTx/>
+                        <a:buFontTx/>
+                        <a:buNone/>
+                        <a:tabLst/>
+                        <a:defRPr/>
+                      </a:pPr>
+                      <a:r>
+                        <a:rPr lang="pt-BR" sz="900" strike="sngStrike" dirty="0">
+                          <a:latin typeface="Gotham HTF"/>
+                        </a:rPr>
+                        <a:t>Aula 04 – Modelo de negócios - Canvas</a:t>
+                      </a:r>
+                    </a:p>
+                  </a:txBody>
+                  <a:tcPr/>
+                </a:tc>
+                <a:tc>
+                  <a:txBody>
+                    <a:bodyPr/>
+                    <a:lstStyle/>
+                    <a:p>
+                      <a:r>
+                        <a:rPr lang="pt-BR" sz="900" dirty="0">
+                          <a:latin typeface="Gotham HTF"/>
+                        </a:rPr>
+                        <a:t>Nascimento da </a:t>
+                      </a:r>
+                      <a:r>
+                        <a:rPr lang="pt-BR" sz="900" dirty="0" err="1">
+                          <a:latin typeface="Gotham HTF"/>
+                        </a:rPr>
+                        <a:t>Óli</a:t>
+                      </a:r>
+                      <a:endParaRPr lang="pt-BR" sz="900" dirty="0">
+                        <a:latin typeface="Gotham HTF"/>
+                      </a:endParaRPr>
+                    </a:p>
+                  </a:txBody>
+                  <a:tcPr/>
+                </a:tc>
+                <a:extLst>
+                  <a:ext uri="{0D108BD9-81ED-4DB2-BD59-A6C34878D82A}">
+                    <a16:rowId xmlns:a16="http://schemas.microsoft.com/office/drawing/2014/main" val="1727146036"/>
+                  </a:ext>
+                </a:extLst>
+              </a:tr>
+              <a:tr h="333595">
+                <a:tc>
+                  <a:txBody>
+                    <a:bodyPr/>
+                    <a:lstStyle/>
+                    <a:p>
+                      <a:r>
+                        <a:rPr lang="pt-BR" sz="900" dirty="0">
+                          <a:solidFill>
+                            <a:schemeClr val="tx1"/>
+                          </a:solidFill>
+                          <a:latin typeface="Gotham HTF"/>
+                        </a:rPr>
+                        <a:t>06</a:t>
+                      </a:r>
+                    </a:p>
+                  </a:txBody>
+                  <a:tcPr/>
+                </a:tc>
+                <a:tc>
+                  <a:txBody>
+                    <a:bodyPr/>
+                    <a:lstStyle/>
+                    <a:p>
+                      <a:r>
+                        <a:rPr lang="pt-BR" sz="900" dirty="0">
+                          <a:latin typeface="Gotham HTF"/>
+                        </a:rPr>
+                        <a:t>Semana 6 – 05/09 e 06/09</a:t>
+                      </a:r>
+                    </a:p>
+                  </a:txBody>
+                  <a:tcPr/>
+                </a:tc>
+                <a:tc>
+                  <a:txBody>
+                    <a:bodyPr/>
+                    <a:lstStyle/>
+                    <a:p>
+                      <a:pPr marL="0" marR="0" lvl="0" indent="0" algn="l" defTabSz="914400" rtl="0" eaLnBrk="1" fontAlgn="auto" latinLnBrk="0" hangingPunct="1">
+                        <a:lnSpc>
+                          <a:spcPct val="100000"/>
+                        </a:lnSpc>
+                        <a:spcBef>
+                          <a:spcPts val="0"/>
+                        </a:spcBef>
+                        <a:spcAft>
+                          <a:spcPts val="0"/>
+                        </a:spcAft>
+                        <a:buClrTx/>
+                        <a:buSzTx/>
+                        <a:buFontTx/>
+                        <a:buNone/>
+                        <a:tabLst/>
+                        <a:defRPr/>
+                      </a:pPr>
+                      <a:r>
+                        <a:rPr lang="pt-BR" sz="900" strike="sngStrike" baseline="0" dirty="0">
+                          <a:latin typeface="Gotham HTF"/>
+                        </a:rPr>
+                        <a:t>Aula 06 - Diagramas de Implantação</a:t>
+                      </a:r>
+                    </a:p>
+                    <a:p>
+                      <a:pPr marL="0" marR="0" lvl="0" indent="0" algn="l" defTabSz="914400" rtl="0" eaLnBrk="1" fontAlgn="auto" latinLnBrk="0" hangingPunct="1">
+                        <a:lnSpc>
+                          <a:spcPct val="100000"/>
+                        </a:lnSpc>
+                        <a:spcBef>
+                          <a:spcPts val="0"/>
+                        </a:spcBef>
+                        <a:spcAft>
+                          <a:spcPts val="0"/>
+                        </a:spcAft>
+                        <a:buClrTx/>
+                        <a:buSzTx/>
+                        <a:buFontTx/>
+                        <a:buNone/>
+                        <a:tabLst/>
+                        <a:defRPr/>
+                      </a:pPr>
+                      <a:r>
+                        <a:rPr lang="pt-BR" sz="900" dirty="0">
+                          <a:latin typeface="Gotham HTF"/>
+                        </a:rPr>
+                        <a:t>Aula 04 – Modelo de negócios - Canvas</a:t>
+                      </a:r>
+                    </a:p>
+                  </a:txBody>
+                  <a:tcPr/>
+                </a:tc>
+                <a:tc>
+                  <a:txBody>
+                    <a:bodyPr/>
+                    <a:lstStyle/>
+                    <a:p>
+                      <a:pPr marL="0" marR="0" lvl="0" indent="0" algn="l" defTabSz="914400" rtl="0" eaLnBrk="1" fontAlgn="auto" latinLnBrk="0" hangingPunct="1">
+                        <a:lnSpc>
+                          <a:spcPct val="100000"/>
+                        </a:lnSpc>
+                        <a:spcBef>
+                          <a:spcPts val="0"/>
+                        </a:spcBef>
+                        <a:spcAft>
+                          <a:spcPts val="0"/>
+                        </a:spcAft>
+                        <a:buClrTx/>
+                        <a:buSzTx/>
+                        <a:buFontTx/>
+                        <a:buNone/>
+                        <a:tabLst/>
+                        <a:defRPr/>
+                      </a:pPr>
+                      <a:r>
+                        <a:rPr lang="pt-BR" sz="900" dirty="0">
+                          <a:solidFill>
+                            <a:srgbClr val="FF0000"/>
+                          </a:solidFill>
+                          <a:latin typeface="Gotham HTF"/>
+                        </a:rPr>
+                        <a:t>OK</a:t>
+                      </a:r>
+                    </a:p>
+                  </a:txBody>
+                  <a:tcPr/>
+                </a:tc>
+                <a:extLst>
+                  <a:ext uri="{0D108BD9-81ED-4DB2-BD59-A6C34878D82A}">
+                    <a16:rowId xmlns:a16="http://schemas.microsoft.com/office/drawing/2014/main" val="1187898213"/>
+                  </a:ext>
+                </a:extLst>
+              </a:tr>
+              <a:tr h="333595">
+                <a:tc>
+                  <a:txBody>
+                    <a:bodyPr/>
+                    <a:lstStyle/>
+                    <a:p>
+                      <a:r>
+                        <a:rPr lang="pt-BR" sz="900" dirty="0">
+                          <a:solidFill>
+                            <a:schemeClr val="tx1"/>
+                          </a:solidFill>
+                          <a:latin typeface="Gotham HTF"/>
+                        </a:rPr>
+                        <a:t>07</a:t>
+                      </a:r>
+                    </a:p>
+                  </a:txBody>
+                  <a:tcPr/>
+                </a:tc>
+                <a:tc>
+                  <a:txBody>
+                    <a:bodyPr/>
+                    <a:lstStyle/>
+                    <a:p>
+                      <a:r>
+                        <a:rPr lang="pt-BR" sz="900" dirty="0">
+                          <a:solidFill>
+                            <a:srgbClr val="FF0000"/>
+                          </a:solidFill>
+                          <a:latin typeface="Gotham HTF"/>
+                        </a:rPr>
+                        <a:t>Semana 7 – 12/09 e 13/09</a:t>
+                      </a:r>
+                    </a:p>
+                  </a:txBody>
+                  <a:tcPr/>
+                </a:tc>
+                <a:tc>
+                  <a:txBody>
+                    <a:bodyPr/>
+                    <a:lstStyle/>
+                    <a:p>
+                      <a:pPr marL="0" marR="0" lvl="0" indent="0" algn="l" defTabSz="914400" rtl="0" eaLnBrk="1" fontAlgn="auto" latinLnBrk="0" hangingPunct="1">
+                        <a:lnSpc>
+                          <a:spcPct val="100000"/>
+                        </a:lnSpc>
+                        <a:spcBef>
+                          <a:spcPts val="0"/>
+                        </a:spcBef>
+                        <a:spcAft>
+                          <a:spcPts val="0"/>
+                        </a:spcAft>
+                        <a:buClrTx/>
+                        <a:buSzTx/>
+                        <a:buFontTx/>
+                        <a:buNone/>
+                        <a:tabLst/>
+                        <a:defRPr/>
+                      </a:pPr>
+                      <a:r>
+                        <a:rPr lang="pt-BR" sz="900" strike="sngStrike" dirty="0">
+                          <a:solidFill>
+                            <a:srgbClr val="FF0000"/>
+                          </a:solidFill>
+                          <a:latin typeface="Gotham HTF"/>
+                        </a:rPr>
+                        <a:t>Checkpoint 01</a:t>
+                      </a:r>
+                    </a:p>
+                    <a:p>
+                      <a:pPr marL="0" marR="0" lvl="0" indent="0" algn="l" defTabSz="914400" rtl="0" eaLnBrk="1" fontAlgn="auto" latinLnBrk="0" hangingPunct="1">
+                        <a:lnSpc>
+                          <a:spcPct val="100000"/>
+                        </a:lnSpc>
+                        <a:spcBef>
+                          <a:spcPts val="0"/>
+                        </a:spcBef>
+                        <a:spcAft>
+                          <a:spcPts val="0"/>
+                        </a:spcAft>
+                        <a:buClrTx/>
+                        <a:buSzTx/>
+                        <a:buFontTx/>
+                        <a:buNone/>
+                        <a:tabLst/>
+                        <a:defRPr/>
+                      </a:pPr>
+                      <a:r>
+                        <a:rPr lang="pt-BR" sz="900" strike="noStrike" dirty="0" err="1">
+                          <a:solidFill>
+                            <a:srgbClr val="FF0000"/>
+                          </a:solidFill>
+                          <a:latin typeface="Gotham HTF"/>
+                        </a:rPr>
+                        <a:t>Exercicios</a:t>
+                      </a:r>
+                      <a:r>
+                        <a:rPr lang="pt-BR" sz="900" strike="noStrike" dirty="0">
+                          <a:solidFill>
+                            <a:srgbClr val="FF0000"/>
+                          </a:solidFill>
+                          <a:latin typeface="Gotham HTF"/>
+                        </a:rPr>
+                        <a:t> de Canvas</a:t>
+                      </a:r>
+                    </a:p>
+                    <a:p>
+                      <a:pPr marL="0" marR="0" lvl="0" indent="0" algn="l" defTabSz="914400" rtl="0" eaLnBrk="1" fontAlgn="auto" latinLnBrk="0" hangingPunct="1">
+                        <a:lnSpc>
+                          <a:spcPct val="100000"/>
+                        </a:lnSpc>
+                        <a:spcBef>
+                          <a:spcPts val="0"/>
+                        </a:spcBef>
+                        <a:spcAft>
+                          <a:spcPts val="0"/>
+                        </a:spcAft>
+                        <a:buClrTx/>
+                        <a:buSzTx/>
+                        <a:buFontTx/>
+                        <a:buNone/>
+                        <a:tabLst/>
+                        <a:defRPr/>
+                      </a:pPr>
+                      <a:r>
+                        <a:rPr lang="pt-BR" sz="900" strike="noStrike" baseline="0" dirty="0">
+                          <a:latin typeface="Gotham HTF"/>
+                        </a:rPr>
+                        <a:t>Aula 05 – Design </a:t>
+                      </a:r>
+                      <a:r>
+                        <a:rPr lang="pt-BR" sz="900" strike="noStrike" baseline="0" dirty="0" err="1">
+                          <a:latin typeface="Gotham HTF"/>
+                        </a:rPr>
+                        <a:t>Thinking</a:t>
+                      </a:r>
+                      <a:endParaRPr lang="pt-BR" sz="900" strike="noStrike" baseline="0" dirty="0">
+                        <a:latin typeface="Gotham HTF"/>
+                      </a:endParaRPr>
+                    </a:p>
+                  </a:txBody>
+                  <a:tcPr/>
+                </a:tc>
+                <a:tc>
+                  <a:txBody>
+                    <a:bodyPr/>
+                    <a:lstStyle/>
+                    <a:p>
+                      <a:pPr marL="0" marR="0" lvl="0" indent="0" algn="l" defTabSz="914400" rtl="0" eaLnBrk="1" fontAlgn="auto" latinLnBrk="0" hangingPunct="1">
+                        <a:lnSpc>
+                          <a:spcPct val="100000"/>
+                        </a:lnSpc>
+                        <a:spcBef>
+                          <a:spcPts val="0"/>
+                        </a:spcBef>
+                        <a:spcAft>
+                          <a:spcPts val="0"/>
+                        </a:spcAft>
+                        <a:buClrTx/>
+                        <a:buSzTx/>
+                        <a:buFontTx/>
+                        <a:buNone/>
+                        <a:tabLst/>
+                        <a:defRPr/>
+                      </a:pPr>
+                      <a:endParaRPr lang="pt-BR" sz="900" dirty="0">
+                        <a:solidFill>
+                          <a:srgbClr val="FF0000"/>
+                        </a:solidFill>
+                        <a:latin typeface="Gotham HTF"/>
+                      </a:endParaRPr>
+                    </a:p>
+                    <a:p>
+                      <a:pPr marL="0" marR="0" lvl="0" indent="0" algn="l" defTabSz="914400" rtl="0" eaLnBrk="1" fontAlgn="auto" latinLnBrk="0" hangingPunct="1">
+                        <a:lnSpc>
+                          <a:spcPct val="100000"/>
+                        </a:lnSpc>
+                        <a:spcBef>
+                          <a:spcPts val="0"/>
+                        </a:spcBef>
+                        <a:spcAft>
+                          <a:spcPts val="0"/>
+                        </a:spcAft>
+                        <a:buClrTx/>
+                        <a:buSzTx/>
+                        <a:buFontTx/>
+                        <a:buNone/>
+                        <a:tabLst/>
+                        <a:defRPr/>
+                      </a:pPr>
+                      <a:r>
+                        <a:rPr lang="pt-BR" sz="900" dirty="0">
+                          <a:solidFill>
+                            <a:srgbClr val="FF0000"/>
+                          </a:solidFill>
+                          <a:latin typeface="Gotham HTF"/>
+                        </a:rPr>
+                        <a:t>Ok </a:t>
+                      </a:r>
+                    </a:p>
+                  </a:txBody>
+                  <a:tcPr/>
+                </a:tc>
+                <a:extLst>
+                  <a:ext uri="{0D108BD9-81ED-4DB2-BD59-A6C34878D82A}">
+                    <a16:rowId xmlns:a16="http://schemas.microsoft.com/office/drawing/2014/main" val="2658113184"/>
+                  </a:ext>
+                </a:extLst>
+              </a:tr>
+              <a:tr h="333595">
+                <a:tc>
+                  <a:txBody>
+                    <a:bodyPr/>
+                    <a:lstStyle/>
+                    <a:p>
+                      <a:r>
+                        <a:rPr lang="pt-BR" sz="900" dirty="0">
+                          <a:solidFill>
+                            <a:schemeClr val="tx1"/>
+                          </a:solidFill>
+                          <a:latin typeface="Gotham HTF"/>
+                        </a:rPr>
+                        <a:t>08</a:t>
+                      </a:r>
+                    </a:p>
+                  </a:txBody>
+                  <a:tcPr/>
+                </a:tc>
+                <a:tc>
+                  <a:txBody>
+                    <a:bodyPr/>
+                    <a:lstStyle/>
+                    <a:p>
+                      <a:r>
+                        <a:rPr lang="pt-BR" sz="900" dirty="0">
+                          <a:latin typeface="Gotham HTF"/>
+                        </a:rPr>
+                        <a:t>Semana 8 – 19/09 e 20/09</a:t>
+                      </a:r>
+                    </a:p>
+                  </a:txBody>
+                  <a:tcPr/>
+                </a:tc>
+                <a:tc>
+                  <a:txBody>
+                    <a:bodyPr/>
+                    <a:lstStyle/>
+                    <a:p>
+                      <a:pPr marL="0" marR="0" lvl="0" indent="0" algn="l" defTabSz="914400" rtl="0" eaLnBrk="1" fontAlgn="auto" latinLnBrk="0" hangingPunct="1">
+                        <a:lnSpc>
+                          <a:spcPct val="100000"/>
+                        </a:lnSpc>
+                        <a:spcBef>
+                          <a:spcPts val="0"/>
+                        </a:spcBef>
+                        <a:spcAft>
+                          <a:spcPts val="0"/>
+                        </a:spcAft>
+                        <a:buClrTx/>
+                        <a:buSzTx/>
+                        <a:buFontTx/>
+                        <a:buNone/>
+                        <a:tabLst/>
+                        <a:defRPr/>
+                      </a:pPr>
+                      <a:r>
+                        <a:rPr lang="pt-BR" sz="900" dirty="0">
+                          <a:solidFill>
+                            <a:srgbClr val="FF0000"/>
+                          </a:solidFill>
+                          <a:latin typeface="Gotham HTF"/>
+                        </a:rPr>
+                        <a:t>Checkpoint 01</a:t>
+                      </a:r>
+                    </a:p>
+                    <a:p>
+                      <a:pPr marL="0" marR="0" lvl="0" indent="0" algn="l" defTabSz="914400" rtl="0" eaLnBrk="1" fontAlgn="auto" latinLnBrk="0" hangingPunct="1">
+                        <a:lnSpc>
+                          <a:spcPct val="100000"/>
+                        </a:lnSpc>
+                        <a:spcBef>
+                          <a:spcPts val="0"/>
+                        </a:spcBef>
+                        <a:spcAft>
+                          <a:spcPts val="0"/>
+                        </a:spcAft>
+                        <a:buClrTx/>
+                        <a:buSzTx/>
+                        <a:buFontTx/>
+                        <a:buNone/>
+                        <a:tabLst/>
+                        <a:defRPr/>
+                      </a:pPr>
+                      <a:r>
+                        <a:rPr lang="pt-BR" sz="900" dirty="0">
+                          <a:latin typeface="Gotham HTF"/>
+                        </a:rPr>
+                        <a:t>Aula 06 – Negócios Digitais (e-commerce)</a:t>
+                      </a:r>
+                    </a:p>
+                  </a:txBody>
+                  <a:tcPr/>
+                </a:tc>
+                <a:tc>
+                  <a:txBody>
+                    <a:bodyPr/>
+                    <a:lstStyle/>
+                    <a:p>
+                      <a:endParaRPr lang="pt-BR" sz="900" dirty="0">
+                        <a:solidFill>
+                          <a:srgbClr val="FF0000"/>
+                        </a:solidFill>
+                        <a:latin typeface="Gotham HTF"/>
+                      </a:endParaRPr>
+                    </a:p>
+                  </a:txBody>
+                  <a:tcPr/>
+                </a:tc>
+                <a:extLst>
+                  <a:ext uri="{0D108BD9-81ED-4DB2-BD59-A6C34878D82A}">
+                    <a16:rowId xmlns:a16="http://schemas.microsoft.com/office/drawing/2014/main" val="814908526"/>
+                  </a:ext>
+                </a:extLst>
+              </a:tr>
+              <a:tr h="333595">
+                <a:tc>
+                  <a:txBody>
+                    <a:bodyPr/>
+                    <a:lstStyle/>
+                    <a:p>
+                      <a:r>
+                        <a:rPr lang="pt-BR" sz="900" dirty="0">
+                          <a:solidFill>
+                            <a:schemeClr val="tx1"/>
+                          </a:solidFill>
+                          <a:latin typeface="Gotham HTF"/>
+                        </a:rPr>
+                        <a:t>09</a:t>
+                      </a:r>
+                    </a:p>
+                  </a:txBody>
+                  <a:tcPr/>
+                </a:tc>
+                <a:tc>
+                  <a:txBody>
+                    <a:bodyPr/>
+                    <a:lstStyle/>
+                    <a:p>
+                      <a:r>
+                        <a:rPr lang="pt-BR" sz="900" strike="noStrike" baseline="0" dirty="0">
+                          <a:solidFill>
+                            <a:schemeClr val="tx1"/>
+                          </a:solidFill>
+                          <a:latin typeface="Gotham HTF"/>
+                        </a:rPr>
+                        <a:t>Semana 9 – 26/09 e 27/09</a:t>
+                      </a:r>
+                    </a:p>
+                  </a:txBody>
+                  <a:tcPr/>
+                </a:tc>
+                <a:tc>
+                  <a:txBody>
+                    <a:bodyPr/>
+                    <a:lstStyle/>
+                    <a:p>
+                      <a:pPr marL="0" marR="0" lvl="0" indent="0" algn="l" defTabSz="914400" rtl="0" eaLnBrk="1" fontAlgn="auto" latinLnBrk="0" hangingPunct="1">
+                        <a:lnSpc>
+                          <a:spcPct val="100000"/>
+                        </a:lnSpc>
+                        <a:spcBef>
+                          <a:spcPts val="0"/>
+                        </a:spcBef>
+                        <a:spcAft>
+                          <a:spcPts val="0"/>
+                        </a:spcAft>
+                        <a:buClrTx/>
+                        <a:buSzTx/>
+                        <a:buFontTx/>
+                        <a:buNone/>
+                        <a:tabLst/>
+                        <a:defRPr/>
+                      </a:pPr>
+                      <a:r>
+                        <a:rPr lang="pt-BR" sz="900" dirty="0">
+                          <a:solidFill>
+                            <a:schemeClr val="tx1"/>
+                          </a:solidFill>
+                          <a:latin typeface="Gotham HTF"/>
+                        </a:rPr>
+                        <a:t>Aula 07 - Precificação de Serviços em TI</a:t>
+                      </a:r>
+                    </a:p>
+                  </a:txBody>
+                  <a:tcPr/>
+                </a:tc>
+                <a:tc>
+                  <a:txBody>
+                    <a:bodyPr/>
+                    <a:lstStyle/>
+                    <a:p>
+                      <a:endParaRPr lang="pt-BR" sz="900" dirty="0">
+                        <a:solidFill>
+                          <a:srgbClr val="FF0000"/>
+                        </a:solidFill>
+                        <a:latin typeface="Gotham HTF"/>
+                      </a:endParaRPr>
+                    </a:p>
+                  </a:txBody>
+                  <a:tcPr/>
+                </a:tc>
+                <a:extLst>
+                  <a:ext uri="{0D108BD9-81ED-4DB2-BD59-A6C34878D82A}">
+                    <a16:rowId xmlns:a16="http://schemas.microsoft.com/office/drawing/2014/main" val="562429672"/>
+                  </a:ext>
+                </a:extLst>
+              </a:tr>
+              <a:tr h="333595">
+                <a:tc>
+                  <a:txBody>
+                    <a:bodyPr/>
+                    <a:lstStyle/>
+                    <a:p>
+                      <a:r>
+                        <a:rPr lang="pt-BR" sz="900" dirty="0">
+                          <a:solidFill>
+                            <a:schemeClr val="tx1"/>
+                          </a:solidFill>
+                          <a:latin typeface="Gotham HTF"/>
+                        </a:rPr>
+                        <a:t>10</a:t>
+                      </a:r>
+                    </a:p>
+                  </a:txBody>
+                  <a:tcPr/>
+                </a:tc>
+                <a:tc>
+                  <a:txBody>
+                    <a:bodyPr/>
+                    <a:lstStyle/>
+                    <a:p>
+                      <a:r>
+                        <a:rPr lang="pt-BR" sz="900" dirty="0">
+                          <a:solidFill>
+                            <a:schemeClr val="tx1"/>
+                          </a:solidFill>
+                          <a:latin typeface="Gotham HTF"/>
+                        </a:rPr>
+                        <a:t>Semana 10 – 03/10 e 04/10</a:t>
+                      </a:r>
+                    </a:p>
+                  </a:txBody>
+                  <a:tcPr/>
+                </a:tc>
+                <a:tc>
+                  <a:txBody>
+                    <a:bodyPr/>
+                    <a:lstStyle/>
+                    <a:p>
+                      <a:pPr marL="0" marR="0" lvl="0" indent="0" algn="l" defTabSz="914400" rtl="0" eaLnBrk="1" fontAlgn="auto" latinLnBrk="0" hangingPunct="1">
+                        <a:lnSpc>
+                          <a:spcPct val="100000"/>
+                        </a:lnSpc>
+                        <a:spcBef>
+                          <a:spcPts val="0"/>
+                        </a:spcBef>
+                        <a:spcAft>
+                          <a:spcPts val="0"/>
+                        </a:spcAft>
+                        <a:buClrTx/>
+                        <a:buSzTx/>
+                        <a:buFontTx/>
+                        <a:buNone/>
+                        <a:tabLst/>
+                        <a:defRPr/>
+                      </a:pPr>
+                      <a:r>
+                        <a:rPr lang="pt-BR" sz="900" b="0" dirty="0">
+                          <a:solidFill>
+                            <a:schemeClr val="tx1"/>
+                          </a:solidFill>
+                          <a:latin typeface="Gotham HTF"/>
+                        </a:rPr>
+                        <a:t>Aula 08 - Retorno de Investimento em TI</a:t>
+                      </a:r>
+                    </a:p>
+                  </a:txBody>
+                  <a:tcPr/>
+                </a:tc>
+                <a:tc>
+                  <a:txBody>
+                    <a:bodyPr/>
+                    <a:lstStyle/>
+                    <a:p>
+                      <a:pPr marL="0" marR="0" lvl="0" indent="0" algn="l" defTabSz="914400" rtl="0" eaLnBrk="1" fontAlgn="auto" latinLnBrk="0" hangingPunct="1">
+                        <a:lnSpc>
+                          <a:spcPct val="100000"/>
+                        </a:lnSpc>
+                        <a:spcBef>
+                          <a:spcPts val="0"/>
+                        </a:spcBef>
+                        <a:spcAft>
+                          <a:spcPts val="0"/>
+                        </a:spcAft>
+                        <a:buClrTx/>
+                        <a:buSzTx/>
+                        <a:buFontTx/>
+                        <a:buNone/>
+                        <a:tabLst/>
+                        <a:defRPr/>
+                      </a:pPr>
+                      <a:endParaRPr lang="pt-BR" sz="900" dirty="0">
+                        <a:solidFill>
+                          <a:srgbClr val="FF0000"/>
+                        </a:solidFill>
+                        <a:latin typeface="Gotham HTF"/>
+                      </a:endParaRPr>
+                    </a:p>
+                  </a:txBody>
+                  <a:tcPr/>
+                </a:tc>
+                <a:extLst>
+                  <a:ext uri="{0D108BD9-81ED-4DB2-BD59-A6C34878D82A}">
+                    <a16:rowId xmlns:a16="http://schemas.microsoft.com/office/drawing/2014/main" val="1993207683"/>
+                  </a:ext>
+                </a:extLst>
+              </a:tr>
+              <a:tr h="333595">
+                <a:tc>
+                  <a:txBody>
+                    <a:bodyPr/>
+                    <a:lstStyle/>
+                    <a:p>
+                      <a:r>
+                        <a:rPr lang="pt-BR" sz="900" dirty="0">
+                          <a:solidFill>
+                            <a:schemeClr val="tx1"/>
+                          </a:solidFill>
+                          <a:latin typeface="Gotham HTF"/>
+                        </a:rPr>
+                        <a:t>11</a:t>
+                      </a:r>
+                    </a:p>
+                  </a:txBody>
+                  <a:tcPr/>
+                </a:tc>
+                <a:tc>
+                  <a:txBody>
+                    <a:bodyPr/>
+                    <a:lstStyle/>
+                    <a:p>
+                      <a:r>
+                        <a:rPr lang="pt-BR" sz="900" strike="noStrike" baseline="0" dirty="0">
+                          <a:solidFill>
+                            <a:schemeClr val="tx1"/>
+                          </a:solidFill>
+                          <a:latin typeface="Gotham HTF"/>
+                        </a:rPr>
+                        <a:t>Semana 11 – 10/10 e 11/10</a:t>
+                      </a:r>
+                    </a:p>
+                  </a:txBody>
+                  <a:tcPr/>
+                </a:tc>
+                <a:tc>
+                  <a:txBody>
+                    <a:bodyPr/>
+                    <a:lstStyle/>
+                    <a:p>
+                      <a:pPr marL="0" marR="0" lvl="0" indent="0" algn="l" defTabSz="914400" rtl="0" eaLnBrk="1" fontAlgn="auto" latinLnBrk="0" hangingPunct="1">
+                        <a:lnSpc>
+                          <a:spcPct val="100000"/>
+                        </a:lnSpc>
+                        <a:spcBef>
+                          <a:spcPts val="0"/>
+                        </a:spcBef>
+                        <a:spcAft>
+                          <a:spcPts val="0"/>
+                        </a:spcAft>
+                        <a:buClrTx/>
+                        <a:buSzTx/>
+                        <a:buFontTx/>
+                        <a:buNone/>
+                        <a:tabLst/>
+                        <a:defRPr/>
+                      </a:pPr>
+                      <a:r>
+                        <a:rPr lang="pt-BR" sz="900" dirty="0">
+                          <a:solidFill>
+                            <a:srgbClr val="FF0000"/>
+                          </a:solidFill>
+                          <a:latin typeface="Gotham HTF"/>
+                        </a:rPr>
+                        <a:t>Checkpoint 02</a:t>
+                      </a:r>
+                    </a:p>
+                  </a:txBody>
+                  <a:tcPr/>
+                </a:tc>
+                <a:tc>
+                  <a:txBody>
+                    <a:bodyPr/>
+                    <a:lstStyle/>
+                    <a:p>
+                      <a:endParaRPr lang="pt-BR" sz="900" dirty="0">
+                        <a:solidFill>
+                          <a:schemeClr val="tx1"/>
+                        </a:solidFill>
+                        <a:latin typeface="Gotham HTF"/>
+                      </a:endParaRPr>
+                    </a:p>
+                  </a:txBody>
+                  <a:tcPr/>
+                </a:tc>
+                <a:extLst>
+                  <a:ext uri="{0D108BD9-81ED-4DB2-BD59-A6C34878D82A}">
+                    <a16:rowId xmlns:a16="http://schemas.microsoft.com/office/drawing/2014/main" val="3193048028"/>
+                  </a:ext>
+                </a:extLst>
+              </a:tr>
+              <a:tr h="333595">
+                <a:tc>
+                  <a:txBody>
+                    <a:bodyPr/>
+                    <a:lstStyle/>
+                    <a:p>
+                      <a:r>
+                        <a:rPr lang="pt-BR" sz="900" dirty="0">
+                          <a:solidFill>
+                            <a:schemeClr val="tx1"/>
+                          </a:solidFill>
+                          <a:latin typeface="Gotham HTF"/>
+                        </a:rPr>
+                        <a:t>12</a:t>
+                      </a:r>
+                    </a:p>
+                  </a:txBody>
+                  <a:tcPr/>
+                </a:tc>
+                <a:tc>
+                  <a:txBody>
+                    <a:bodyPr/>
+                    <a:lstStyle/>
+                    <a:p>
+                      <a:r>
+                        <a:rPr lang="pt-BR" sz="900" dirty="0">
+                          <a:solidFill>
+                            <a:schemeClr val="tx1"/>
+                          </a:solidFill>
+                          <a:latin typeface="Gotham HTF"/>
+                        </a:rPr>
+                        <a:t>Semana 12 – 17/10 e 18/10</a:t>
+                      </a:r>
+                    </a:p>
+                  </a:txBody>
+                  <a:tcPr/>
+                </a:tc>
+                <a:tc>
+                  <a:txBody>
+                    <a:bodyPr/>
+                    <a:lstStyle/>
+                    <a:p>
+                      <a:pPr marL="0" marR="0" lvl="0" indent="0" algn="l" defTabSz="914400" rtl="0" eaLnBrk="1" fontAlgn="auto" latinLnBrk="0" hangingPunct="1">
+                        <a:lnSpc>
+                          <a:spcPct val="100000"/>
+                        </a:lnSpc>
+                        <a:spcBef>
+                          <a:spcPts val="0"/>
+                        </a:spcBef>
+                        <a:spcAft>
+                          <a:spcPts val="0"/>
+                        </a:spcAft>
+                        <a:buClrTx/>
+                        <a:buSzTx/>
+                        <a:buFontTx/>
+                        <a:buNone/>
+                        <a:tabLst/>
+                        <a:defRPr/>
+                      </a:pPr>
+                      <a:r>
+                        <a:rPr lang="pt-BR" sz="900" dirty="0">
+                          <a:solidFill>
+                            <a:schemeClr val="tx1"/>
+                          </a:solidFill>
+                          <a:latin typeface="Gotham HTF"/>
+                        </a:rPr>
+                        <a:t>Aula 09 - Gestão de Serviços SLA</a:t>
+                      </a:r>
+                    </a:p>
+                  </a:txBody>
+                  <a:tcPr/>
+                </a:tc>
+                <a:tc>
+                  <a:txBody>
+                    <a:bodyPr/>
+                    <a:lstStyle/>
+                    <a:p>
+                      <a:endParaRPr lang="pt-BR" sz="900" dirty="0">
+                        <a:solidFill>
+                          <a:srgbClr val="FF0000"/>
+                        </a:solidFill>
+                        <a:latin typeface="Gotham HTF"/>
+                      </a:endParaRPr>
+                    </a:p>
+                  </a:txBody>
+                  <a:tcPr/>
+                </a:tc>
+                <a:extLst>
+                  <a:ext uri="{0D108BD9-81ED-4DB2-BD59-A6C34878D82A}">
+                    <a16:rowId xmlns:a16="http://schemas.microsoft.com/office/drawing/2014/main" val="1309763790"/>
+                  </a:ext>
+                </a:extLst>
+              </a:tr>
+              <a:tr h="333595">
+                <a:tc>
+                  <a:txBody>
+                    <a:bodyPr/>
+                    <a:lstStyle/>
+                    <a:p>
+                      <a:r>
+                        <a:rPr lang="pt-BR" sz="900" dirty="0">
+                          <a:solidFill>
+                            <a:schemeClr val="tx1"/>
+                          </a:solidFill>
+                          <a:latin typeface="Gotham HTF"/>
+                        </a:rPr>
+                        <a:t>13</a:t>
+                      </a:r>
+                    </a:p>
+                  </a:txBody>
+                  <a:tcPr/>
+                </a:tc>
+                <a:tc>
+                  <a:txBody>
+                    <a:bodyPr/>
+                    <a:lstStyle/>
+                    <a:p>
+                      <a:r>
+                        <a:rPr lang="pt-BR" sz="900" dirty="0">
+                          <a:solidFill>
+                            <a:schemeClr val="tx1"/>
+                          </a:solidFill>
+                          <a:latin typeface="Gotham HTF"/>
+                        </a:rPr>
+                        <a:t>Semana 13 – 24/10 e 25/10</a:t>
+                      </a:r>
+                    </a:p>
+                  </a:txBody>
+                  <a:tcPr/>
+                </a:tc>
+                <a:tc>
+                  <a:txBody>
+                    <a:bodyPr/>
+                    <a:lstStyle/>
+                    <a:p>
+                      <a:r>
+                        <a:rPr lang="pt-BR" sz="900" dirty="0">
+                          <a:solidFill>
+                            <a:schemeClr val="tx1"/>
+                          </a:solidFill>
+                          <a:latin typeface="Gotham HTF"/>
+                        </a:rPr>
+                        <a:t>Aula 10 - LGPD</a:t>
+                      </a:r>
+                    </a:p>
+                  </a:txBody>
+                  <a:tcPr/>
+                </a:tc>
+                <a:tc>
+                  <a:txBody>
+                    <a:bodyPr/>
+                    <a:lstStyle/>
+                    <a:p>
+                      <a:pPr marL="0" marR="0" lvl="0" indent="0" algn="l" defTabSz="914400" rtl="0" eaLnBrk="1" fontAlgn="auto" latinLnBrk="0" hangingPunct="1">
+                        <a:lnSpc>
+                          <a:spcPct val="100000"/>
+                        </a:lnSpc>
+                        <a:spcBef>
+                          <a:spcPts val="0"/>
+                        </a:spcBef>
+                        <a:spcAft>
+                          <a:spcPts val="0"/>
+                        </a:spcAft>
+                        <a:buClrTx/>
+                        <a:buSzTx/>
+                        <a:buFontTx/>
+                        <a:buNone/>
+                        <a:tabLst/>
+                        <a:defRPr/>
+                      </a:pPr>
+                      <a:endParaRPr lang="pt-BR" sz="900" dirty="0">
+                        <a:solidFill>
+                          <a:srgbClr val="FF0000"/>
+                        </a:solidFill>
+                        <a:latin typeface="Gotham HTF"/>
+                      </a:endParaRPr>
+                    </a:p>
+                  </a:txBody>
+                  <a:tcPr/>
+                </a:tc>
+                <a:extLst>
+                  <a:ext uri="{0D108BD9-81ED-4DB2-BD59-A6C34878D82A}">
+                    <a16:rowId xmlns:a16="http://schemas.microsoft.com/office/drawing/2014/main" val="2727002085"/>
+                  </a:ext>
+                </a:extLst>
+              </a:tr>
+              <a:tr h="333595">
+                <a:tc>
+                  <a:txBody>
+                    <a:bodyPr/>
+                    <a:lstStyle/>
+                    <a:p>
+                      <a:r>
+                        <a:rPr lang="pt-BR" sz="900" dirty="0">
+                          <a:solidFill>
+                            <a:schemeClr val="tx1"/>
+                          </a:solidFill>
+                          <a:latin typeface="Gotham HTF"/>
+                        </a:rPr>
+                        <a:t>14</a:t>
+                      </a:r>
+                    </a:p>
+                  </a:txBody>
+                  <a:tcPr/>
+                </a:tc>
+                <a:tc>
+                  <a:txBody>
+                    <a:bodyPr/>
+                    <a:lstStyle/>
+                    <a:p>
+                      <a:r>
+                        <a:rPr lang="pt-BR" sz="900" dirty="0">
+                          <a:solidFill>
+                            <a:schemeClr val="tx1"/>
+                          </a:solidFill>
+                          <a:latin typeface="Gotham HTF"/>
+                        </a:rPr>
+                        <a:t>Semana 14 – 31/10 e 01/11</a:t>
+                      </a:r>
+                    </a:p>
+                  </a:txBody>
+                  <a:tcPr/>
+                </a:tc>
+                <a:tc>
+                  <a:txBody>
+                    <a:bodyPr/>
+                    <a:lstStyle/>
+                    <a:p>
+                      <a:pPr marL="0" marR="0" lvl="0" indent="0" algn="l" defTabSz="914400" rtl="0" eaLnBrk="1" fontAlgn="auto" latinLnBrk="0" hangingPunct="1">
+                        <a:lnSpc>
+                          <a:spcPct val="100000"/>
+                        </a:lnSpc>
+                        <a:spcBef>
+                          <a:spcPts val="0"/>
+                        </a:spcBef>
+                        <a:spcAft>
+                          <a:spcPts val="0"/>
+                        </a:spcAft>
+                        <a:buClrTx/>
+                        <a:buSzTx/>
+                        <a:buFontTx/>
+                        <a:buNone/>
+                        <a:tabLst/>
+                        <a:defRPr/>
+                      </a:pPr>
+                      <a:r>
+                        <a:rPr lang="pt-BR" sz="900" dirty="0">
+                          <a:solidFill>
+                            <a:schemeClr val="tx1"/>
+                          </a:solidFill>
+                          <a:latin typeface="Gotham HTF"/>
+                        </a:rPr>
+                        <a:t>Aula 11 - Plano de Negócios</a:t>
+                      </a:r>
+                    </a:p>
+                  </a:txBody>
+                  <a:tcPr/>
+                </a:tc>
+                <a:tc>
+                  <a:txBody>
+                    <a:bodyPr/>
+                    <a:lstStyle/>
+                    <a:p>
+                      <a:pPr marL="0" marR="0" lvl="0" indent="0" algn="l" defTabSz="914400" rtl="0" eaLnBrk="1" fontAlgn="auto" latinLnBrk="0" hangingPunct="1">
+                        <a:lnSpc>
+                          <a:spcPct val="100000"/>
+                        </a:lnSpc>
+                        <a:spcBef>
+                          <a:spcPts val="0"/>
+                        </a:spcBef>
+                        <a:spcAft>
+                          <a:spcPts val="0"/>
+                        </a:spcAft>
+                        <a:buClrTx/>
+                        <a:buSzTx/>
+                        <a:buFontTx/>
+                        <a:buNone/>
+                        <a:tabLst/>
+                        <a:defRPr/>
+                      </a:pPr>
+                      <a:endParaRPr lang="pt-BR" sz="900" dirty="0">
+                        <a:latin typeface="Gotham HTF"/>
+                      </a:endParaRPr>
+                    </a:p>
+                  </a:txBody>
+                  <a:tcPr/>
+                </a:tc>
+                <a:extLst>
+                  <a:ext uri="{0D108BD9-81ED-4DB2-BD59-A6C34878D82A}">
+                    <a16:rowId xmlns:a16="http://schemas.microsoft.com/office/drawing/2014/main" val="1735729972"/>
+                  </a:ext>
+                </a:extLst>
+              </a:tr>
+              <a:tr h="333595">
+                <a:tc>
+                  <a:txBody>
+                    <a:bodyPr/>
+                    <a:lstStyle/>
+                    <a:p>
+                      <a:r>
+                        <a:rPr lang="pt-BR" sz="900" dirty="0">
+                          <a:solidFill>
+                            <a:schemeClr val="tx1"/>
+                          </a:solidFill>
+                          <a:latin typeface="Gotham HTF"/>
+                        </a:rPr>
+                        <a:t>16</a:t>
+                      </a:r>
+                    </a:p>
+                  </a:txBody>
+                  <a:tcPr/>
+                </a:tc>
+                <a:tc>
+                  <a:txBody>
+                    <a:bodyPr/>
+                    <a:lstStyle/>
+                    <a:p>
+                      <a:r>
+                        <a:rPr lang="pt-BR" sz="900" dirty="0">
+                          <a:solidFill>
+                            <a:schemeClr val="tx1"/>
+                          </a:solidFill>
+                          <a:latin typeface="Gotham HTF"/>
+                        </a:rPr>
+                        <a:t>Semana 15 – 07/11 e 08/11</a:t>
+                      </a:r>
+                    </a:p>
+                  </a:txBody>
+                  <a:tcPr/>
+                </a:tc>
+                <a:tc>
+                  <a:txBody>
+                    <a:bodyPr/>
+                    <a:lstStyle/>
+                    <a:p>
+                      <a:pPr marL="0" marR="0" lvl="0" indent="0" algn="l" defTabSz="914400" rtl="0" eaLnBrk="1" fontAlgn="auto" latinLnBrk="0" hangingPunct="1">
+                        <a:lnSpc>
+                          <a:spcPct val="100000"/>
+                        </a:lnSpc>
+                        <a:spcBef>
+                          <a:spcPts val="0"/>
+                        </a:spcBef>
+                        <a:spcAft>
+                          <a:spcPts val="0"/>
+                        </a:spcAft>
+                        <a:buClrTx/>
+                        <a:buSzTx/>
+                        <a:buFontTx/>
+                        <a:buNone/>
+                        <a:tabLst/>
+                        <a:defRPr/>
+                      </a:pPr>
+                      <a:r>
+                        <a:rPr lang="pt-BR" sz="900" dirty="0">
+                          <a:solidFill>
+                            <a:srgbClr val="FF0000"/>
+                          </a:solidFill>
+                          <a:latin typeface="Gotham HTF"/>
+                        </a:rPr>
+                        <a:t>Checkpoint 03</a:t>
+                      </a:r>
+                    </a:p>
+                  </a:txBody>
+                  <a:tcPr/>
+                </a:tc>
+                <a:tc>
+                  <a:txBody>
+                    <a:bodyPr/>
+                    <a:lstStyle/>
+                    <a:p>
+                      <a:pPr marL="0" marR="0" lvl="0" indent="0" algn="l" defTabSz="914400" rtl="0" eaLnBrk="1" fontAlgn="auto" latinLnBrk="0" hangingPunct="1">
+                        <a:lnSpc>
+                          <a:spcPct val="100000"/>
+                        </a:lnSpc>
+                        <a:spcBef>
+                          <a:spcPts val="0"/>
+                        </a:spcBef>
+                        <a:spcAft>
+                          <a:spcPts val="0"/>
+                        </a:spcAft>
+                        <a:buClrTx/>
+                        <a:buSzTx/>
+                        <a:buFontTx/>
+                        <a:buNone/>
+                        <a:tabLst/>
+                        <a:defRPr/>
+                      </a:pPr>
+                      <a:endParaRPr lang="pt-BR" sz="900" dirty="0">
+                        <a:latin typeface="Gotham HTF"/>
+                      </a:endParaRPr>
+                    </a:p>
+                  </a:txBody>
+                  <a:tcPr/>
+                </a:tc>
+                <a:extLst>
+                  <a:ext uri="{0D108BD9-81ED-4DB2-BD59-A6C34878D82A}">
+                    <a16:rowId xmlns:a16="http://schemas.microsoft.com/office/drawing/2014/main" val="1824119214"/>
+                  </a:ext>
+                </a:extLst>
+              </a:tr>
+              <a:tr h="333595">
+                <a:tc>
+                  <a:txBody>
+                    <a:bodyPr/>
+                    <a:lstStyle/>
+                    <a:p>
+                      <a:endParaRPr lang="pt-BR" sz="900" dirty="0">
+                        <a:solidFill>
+                          <a:schemeClr val="tx1"/>
+                        </a:solidFill>
+                        <a:latin typeface="Gotham HTF"/>
+                      </a:endParaRPr>
+                    </a:p>
+                  </a:txBody>
+                  <a:tcPr/>
+                </a:tc>
+                <a:tc>
+                  <a:txBody>
+                    <a:bodyPr/>
+                    <a:lstStyle/>
+                    <a:p>
+                      <a:endParaRPr lang="pt-BR" sz="900" dirty="0">
+                        <a:solidFill>
+                          <a:schemeClr val="tx1"/>
+                        </a:solidFill>
+                        <a:latin typeface="Gotham HTF"/>
+                      </a:endParaRPr>
+                    </a:p>
+                  </a:txBody>
+                  <a:tcPr/>
+                </a:tc>
+                <a:tc>
+                  <a:txBody>
+                    <a:bodyPr/>
+                    <a:lstStyle/>
+                    <a:p>
+                      <a:pPr marL="0" marR="0" lvl="0" indent="0" algn="l" defTabSz="914400" rtl="0" eaLnBrk="1" fontAlgn="auto" latinLnBrk="0" hangingPunct="1">
+                        <a:lnSpc>
+                          <a:spcPct val="100000"/>
+                        </a:lnSpc>
+                        <a:spcBef>
+                          <a:spcPts val="0"/>
+                        </a:spcBef>
+                        <a:spcAft>
+                          <a:spcPts val="0"/>
+                        </a:spcAft>
+                        <a:buClrTx/>
+                        <a:buSzTx/>
+                        <a:buFontTx/>
+                        <a:buNone/>
+                        <a:tabLst/>
+                        <a:defRPr/>
+                      </a:pPr>
+                      <a:endParaRPr lang="pt-BR" sz="900" dirty="0">
+                        <a:solidFill>
+                          <a:srgbClr val="FF0000"/>
+                        </a:solidFill>
+                        <a:latin typeface="Gotham HTF"/>
+                      </a:endParaRPr>
+                    </a:p>
+                  </a:txBody>
+                  <a:tcPr/>
+                </a:tc>
+                <a:tc>
+                  <a:txBody>
+                    <a:bodyPr/>
+                    <a:lstStyle/>
+                    <a:p>
+                      <a:pPr marL="0" marR="0" lvl="0" indent="0" algn="l" defTabSz="914400" rtl="0" eaLnBrk="1" fontAlgn="auto" latinLnBrk="0" hangingPunct="1">
+                        <a:lnSpc>
+                          <a:spcPct val="100000"/>
+                        </a:lnSpc>
+                        <a:spcBef>
+                          <a:spcPts val="0"/>
+                        </a:spcBef>
+                        <a:spcAft>
+                          <a:spcPts val="0"/>
+                        </a:spcAft>
+                        <a:buClrTx/>
+                        <a:buSzTx/>
+                        <a:buFontTx/>
+                        <a:buNone/>
+                        <a:tabLst/>
+                        <a:defRPr/>
+                      </a:pPr>
+                      <a:endParaRPr lang="pt-BR" sz="900" dirty="0">
+                        <a:latin typeface="Gotham HTF"/>
+                      </a:endParaRPr>
+                    </a:p>
+                  </a:txBody>
+                  <a:tcPr/>
+                </a:tc>
+                <a:extLst>
+                  <a:ext uri="{0D108BD9-81ED-4DB2-BD59-A6C34878D82A}">
+                    <a16:rowId xmlns:a16="http://schemas.microsoft.com/office/drawing/2014/main" val="789350702"/>
+                  </a:ext>
+                </a:extLst>
+              </a:tr>
+            </a:tbl>
+          </a:graphicData>
+        </a:graphic>
+      </p:graphicFrame>
+    </p:spTree>
+    <p:extLst>
+      <p:ext uri="{BB962C8B-B14F-4D97-AF65-F5344CB8AC3E}">
+        <p14:creationId xmlns:p14="http://schemas.microsoft.com/office/powerpoint/2010/main" val="309667797"/>
+      </p:ext>
+    </p:extLst>
+  </p:cSld>
+  <p:clrMapOvr>
+    <a:masterClrMapping/>
+  </p:clrMapOvr>
+  <mc:AlternateContent xmlns:mc="http://schemas.openxmlformats.org/markup-compatibility/2006" xmlns:p14="http://schemas.microsoft.com/office/powerpoint/2010/main">
+    <mc:Choice Requires="p14">
+      <p:transition spd="med" p14:dur="700">
+        <p:fade/>
+      </p:transition>
+    </mc:Choice>
+    <mc:Fallback xmlns="">
+      <p:transition spd="med">
+        <p:fade/>
+      </p:transition>
+    </mc:Fallback>
+  </mc:AlternateContent>
+</p:sld>
+</file>
+
+<file path=ppt/slides/slide16.xml><?xml version="1.0" encoding="utf-8"?>
 <p:sld xmlns:a="http://schemas.openxmlformats.org/drawingml/2006/main" xmlns:r="http://schemas.openxmlformats.org/officeDocument/2006/relationships" xmlns:p="http://schemas.openxmlformats.org/presentationml/2006/main">
   <p:cSld>
     <p:spTree>
@@ -10685,13 +12648,13 @@
   <p:clrMapOvr>
     <a:masterClrMapping/>
   </p:clrMapOvr>
-  <mc:AlternateContent xmlns:mc="http://schemas.openxmlformats.org/markup-compatibility/2006">
-    <mc:Choice xmlns:p14="http://schemas.microsoft.com/office/powerpoint/2010/main" Requires="p14">
+  <mc:AlternateContent xmlns:mc="http://schemas.openxmlformats.org/markup-compatibility/2006" xmlns:p14="http://schemas.microsoft.com/office/powerpoint/2010/main">
+    <mc:Choice Requires="p14">
       <p:transition spd="med" p14:dur="700">
         <p:fade/>
       </p:transition>
     </mc:Choice>
-    <mc:Fallback>
+    <mc:Fallback xmlns="">
       <p:transition spd="med">
         <p:fade/>
       </p:transition>
@@ -10700,7 +12663,7 @@
 </p:sld>
 </file>
 
-<file path=ppt/slides/slide16.xml><?xml version="1.0" encoding="utf-8"?>
+<file path=ppt/slides/slide17.xml><?xml version="1.0" encoding="utf-8"?>
 <p:sld xmlns:a="http://schemas.openxmlformats.org/drawingml/2006/main" xmlns:r="http://schemas.openxmlformats.org/officeDocument/2006/relationships" xmlns:p="http://schemas.openxmlformats.org/presentationml/2006/main">
   <p:cSld>
     <p:spTree>
@@ -10885,7 +12848,7 @@
             <a:fld id="{3F951EF7-2A75-44A0-8045-6A6595E5FF16}" type="slidenum">
               <a:rPr lang="pt-BR" smtClean="0"/>
               <a:pPr/>
-              <a:t>16</a:t>
+              <a:t>17</a:t>
             </a:fld>
             <a:endParaRPr lang="pt-BR" dirty="0"/>
           </a:p>
@@ -19391,13 +21354,13 @@
   <p:clrMapOvr>
     <a:masterClrMapping/>
   </p:clrMapOvr>
-  <mc:AlternateContent xmlns:mc="http://schemas.openxmlformats.org/markup-compatibility/2006">
-    <mc:Choice xmlns:p14="http://schemas.microsoft.com/office/powerpoint/2010/main" Requires="p14">
+  <mc:AlternateContent xmlns:mc="http://schemas.openxmlformats.org/markup-compatibility/2006" xmlns:p14="http://schemas.microsoft.com/office/powerpoint/2010/main">
+    <mc:Choice Requires="p14">
       <p:transition spd="med" p14:dur="700">
         <p:fade/>
       </p:transition>
     </mc:Choice>
-    <mc:Fallback>
+    <mc:Fallback xmlns="">
       <p:transition spd="med">
         <p:fade/>
       </p:transition>

</xml_diff>